<commit_message>
Ajuste nos membros da banca e na apresentacao
</commit_message>
<xml_diff>
--- a/apresentacao/ApresentacaoTCC.pptx
+++ b/apresentacao/ApresentacaoTCC.pptx
@@ -155,7 +155,7 @@
 
 <file path=ppt/commentAuthors.xml><?xml version="1.0" encoding="utf-8"?>
 <p:cmAuthorLst xmlns:a="http://schemas.openxmlformats.org/drawingml/2006/main" xmlns:r="http://schemas.openxmlformats.org/officeDocument/2006/relationships" xmlns:p="http://schemas.openxmlformats.org/presentationml/2006/main">
-  <p:cmAuthor id="1" name="Marcos Bahiense" initials="MB" lastIdx="6" clrIdx="0">
+  <p:cmAuthor id="1" name="Marcos Bahiense" initials="MB" lastIdx="7" clrIdx="0">
     <p:extLst>
       <p:ext uri="{19B8F6BF-5375-455C-9EA6-DF929625EA0E}">
         <p15:presenceInfo xmlns:p15="http://schemas.microsoft.com/office/powerpoint/2012/main" userId="5e7f4f7a3effe3df" providerId="Windows Live"/>
@@ -4503,7 +4503,7 @@
   <dgm:whole/>
   <dgm:extLst>
     <a:ext uri="http://schemas.microsoft.com/office/drawing/2008/diagram">
-      <dsp:dataModelExt xmlns:dsp="http://schemas.microsoft.com/office/drawing/2008/diagram" relId="rId6" minVer="http://schemas.openxmlformats.org/drawingml/2006/diagram"/>
+      <dsp:dataModelExt xmlns:dsp="http://schemas.microsoft.com/office/drawing/2008/diagram" relId="rId7" minVer="http://schemas.openxmlformats.org/drawingml/2006/diagram"/>
     </a:ext>
   </dgm:extLst>
 </dgm:dataModel>
@@ -5162,8 +5162,8 @@
     <dgm:cxn modelId="{4272A863-85C3-4610-AAB5-32AE95AFC598}" type="presOf" srcId="{28034F4E-EB66-4F89-815A-17F4625EBF77}" destId="{F1452B49-28FC-4E5F-B1E8-20AB6C0B40A2}" srcOrd="0" destOrd="0" presId="urn:microsoft.com/office/officeart/2009/3/layout/PhasedProcess"/>
     <dgm:cxn modelId="{4BDC4CA5-85DE-4E3E-AE0A-2283E4101C9E}" srcId="{C629C175-D6C0-44F4-B0E0-459F2CF8E03E}" destId="{A6D82E76-ED96-4EB6-9CBD-ECC103FB138C}" srcOrd="0" destOrd="0" parTransId="{6EB7F386-EC80-4E60-A208-66BB57AAFF51}" sibTransId="{B56DF9A8-F7BC-44A8-80BC-C993326A27F7}"/>
     <dgm:cxn modelId="{8E92CA84-4907-4470-AE9A-316DFCC7FDB7}" srcId="{345A455F-40F9-4934-B4E5-D3F67D0C7079}" destId="{C629C175-D6C0-44F4-B0E0-459F2CF8E03E}" srcOrd="2" destOrd="0" parTransId="{F6EB0CA8-E72D-4ED7-B5F2-17FFCDFBFEC8}" sibTransId="{9E17C8D2-72BB-46EE-86FE-6DBD00252111}"/>
+    <dgm:cxn modelId="{E20CDF5C-4F68-46A3-9E4F-ABC5AA1ADE91}" type="presOf" srcId="{345A455F-40F9-4934-B4E5-D3F67D0C7079}" destId="{FBB995CE-8B94-4CD0-BD49-EECB381C7D3C}" srcOrd="0" destOrd="0" presId="urn:microsoft.com/office/officeart/2009/3/layout/PhasedProcess"/>
     <dgm:cxn modelId="{BCB409C1-88C3-489B-B843-79A2A7EC0D52}" srcId="{4DC0A582-81C7-4743-888E-88967573F5DD}" destId="{E28DEC30-C135-4FFF-AAB9-01AF5BBA6B57}" srcOrd="2" destOrd="0" parTransId="{DB5CC180-3346-4415-B01A-0DAAA99EC3A9}" sibTransId="{B4845B3F-5233-4801-BC59-5923D20D3003}"/>
-    <dgm:cxn modelId="{E20CDF5C-4F68-46A3-9E4F-ABC5AA1ADE91}" type="presOf" srcId="{345A455F-40F9-4934-B4E5-D3F67D0C7079}" destId="{FBB995CE-8B94-4CD0-BD49-EECB381C7D3C}" srcOrd="0" destOrd="0" presId="urn:microsoft.com/office/officeart/2009/3/layout/PhasedProcess"/>
     <dgm:cxn modelId="{BD3F4DF7-6F6A-408E-BACA-27272821F4A5}" srcId="{4DC0A582-81C7-4743-888E-88967573F5DD}" destId="{D19B9532-B2D8-4D1D-B2B7-A8FD5C0A0134}" srcOrd="0" destOrd="0" parTransId="{812EAB14-461A-4E8A-90D8-7A9AA84832C0}" sibTransId="{D50548D1-E726-49B5-99D0-DA5DB1075CDC}"/>
     <dgm:cxn modelId="{006CEA20-F8CA-41DF-9B28-C49D4F573C6A}" srcId="{345A455F-40F9-4934-B4E5-D3F67D0C7079}" destId="{4DC0A582-81C7-4743-888E-88967573F5DD}" srcOrd="0" destOrd="0" parTransId="{FA31AD39-88EB-4041-964E-E08445ACFE1E}" sibTransId="{218A865B-375D-459E-AEFA-2B7D6FE4184A}"/>
     <dgm:cxn modelId="{41CC7B00-27C0-4EA0-BA3E-266A8D60CCF1}" type="presParOf" srcId="{FBB995CE-8B94-4CD0-BD49-EECB381C7D3C}" destId="{030AF388-B36F-4738-8CF9-A877D2C54BDE}" srcOrd="0" destOrd="0" presId="urn:microsoft.com/office/officeart/2009/3/layout/PhasedProcess"/>
@@ -5191,7 +5191,7 @@
   <dgm:whole/>
   <dgm:extLst>
     <a:ext uri="http://schemas.microsoft.com/office/drawing/2008/diagram">
-      <dsp:dataModelExt xmlns:dsp="http://schemas.microsoft.com/office/drawing/2008/diagram" relId="rId6" minVer="http://schemas.openxmlformats.org/drawingml/2006/diagram"/>
+      <dsp:dataModelExt xmlns:dsp="http://schemas.microsoft.com/office/drawing/2008/diagram" relId="rId7" minVer="http://schemas.openxmlformats.org/drawingml/2006/diagram"/>
     </a:ext>
   </dgm:extLst>
 </dgm:dataModel>
@@ -5527,7 +5527,7 @@
   <dgm:whole/>
   <dgm:extLst>
     <a:ext uri="http://schemas.microsoft.com/office/drawing/2008/diagram">
-      <dsp:dataModelExt xmlns:dsp="http://schemas.microsoft.com/office/drawing/2008/diagram" relId="rId6" minVer="http://schemas.openxmlformats.org/drawingml/2006/diagram"/>
+      <dsp:dataModelExt xmlns:dsp="http://schemas.microsoft.com/office/drawing/2008/diagram" relId="rId7" minVer="http://schemas.openxmlformats.org/drawingml/2006/diagram"/>
     </a:ext>
   </dgm:extLst>
 </dgm:dataModel>
@@ -17891,7 +17891,7 @@
             <a:fld id="{923DD2E7-097F-46BB-B15B-C037056A3A04}" type="datetimeFigureOut">
               <a:rPr lang="pt-BR" smtClean="0"/>
               <a:pPr/>
-              <a:t>07/12/2015</a:t>
+              <a:t>08/12/2015</a:t>
             </a:fld>
             <a:endParaRPr lang="pt-BR"/>
           </a:p>
@@ -18245,7 +18245,1253 @@
 </p:notes>
 </file>
 
+<file path=ppt/notesSlides/notesSlide10.xml><?xml version="1.0" encoding="utf-8"?>
+<p:notes xmlns:a="http://schemas.openxmlformats.org/drawingml/2006/main" xmlns:r="http://schemas.openxmlformats.org/officeDocument/2006/relationships" xmlns:p="http://schemas.openxmlformats.org/presentationml/2006/main">
+  <p:cSld>
+    <p:spTree>
+      <p:nvGrpSpPr>
+        <p:cNvPr id="1" name=""/>
+        <p:cNvGrpSpPr/>
+        <p:nvPr/>
+      </p:nvGrpSpPr>
+      <p:grpSpPr>
+        <a:xfrm>
+          <a:off x="0" y="0"/>
+          <a:ext cx="0" cy="0"/>
+          <a:chOff x="0" y="0"/>
+          <a:chExt cx="0" cy="0"/>
+        </a:xfrm>
+      </p:grpSpPr>
+      <p:sp>
+        <p:nvSpPr>
+          <p:cNvPr id="2" name="Espaço Reservado para Imagem de Slide 1"/>
+          <p:cNvSpPr>
+            <a:spLocks noGrp="1" noRot="1" noChangeAspect="1"/>
+          </p:cNvSpPr>
+          <p:nvPr>
+            <p:ph type="sldImg"/>
+          </p:nvPr>
+        </p:nvSpPr>
+        <p:spPr/>
+      </p:sp>
+      <p:sp>
+        <p:nvSpPr>
+          <p:cNvPr id="3" name="Espaço Reservado para Anotações 2"/>
+          <p:cNvSpPr>
+            <a:spLocks noGrp="1"/>
+          </p:cNvSpPr>
+          <p:nvPr>
+            <p:ph type="body" idx="1"/>
+          </p:nvPr>
+        </p:nvSpPr>
+        <p:spPr/>
+        <p:txBody>
+          <a:bodyPr/>
+          <a:lstStyle/>
+          <a:p>
+            <a:endParaRPr lang="pt-BR"/>
+          </a:p>
+        </p:txBody>
+      </p:sp>
+      <p:sp>
+        <p:nvSpPr>
+          <p:cNvPr id="4" name="Espaço Reservado para Número de Slide 3"/>
+          <p:cNvSpPr>
+            <a:spLocks noGrp="1"/>
+          </p:cNvSpPr>
+          <p:nvPr>
+            <p:ph type="sldNum" sz="quarter" idx="10"/>
+          </p:nvPr>
+        </p:nvSpPr>
+        <p:spPr/>
+        <p:txBody>
+          <a:bodyPr/>
+          <a:lstStyle/>
+          <a:p>
+            <a:fld id="{75D2E228-96DA-4099-BDBF-4E496F3FD30A}" type="slidenum">
+              <a:rPr lang="pt-BR" smtClean="0"/>
+              <a:pPr/>
+              <a:t>11</a:t>
+            </a:fld>
+            <a:endParaRPr lang="pt-BR"/>
+          </a:p>
+        </p:txBody>
+      </p:sp>
+    </p:spTree>
+    <p:extLst>
+      <p:ext uri="{BB962C8B-B14F-4D97-AF65-F5344CB8AC3E}">
+        <p14:creationId xmlns:p14="http://schemas.microsoft.com/office/powerpoint/2010/main" val="3695486879"/>
+      </p:ext>
+    </p:extLst>
+  </p:cSld>
+  <p:clrMapOvr>
+    <a:masterClrMapping/>
+  </p:clrMapOvr>
+</p:notes>
+</file>
+
+<file path=ppt/notesSlides/notesSlide11.xml><?xml version="1.0" encoding="utf-8"?>
+<p:notes xmlns:a="http://schemas.openxmlformats.org/drawingml/2006/main" xmlns:r="http://schemas.openxmlformats.org/officeDocument/2006/relationships" xmlns:p="http://schemas.openxmlformats.org/presentationml/2006/main">
+  <p:cSld>
+    <p:spTree>
+      <p:nvGrpSpPr>
+        <p:cNvPr id="1" name=""/>
+        <p:cNvGrpSpPr/>
+        <p:nvPr/>
+      </p:nvGrpSpPr>
+      <p:grpSpPr>
+        <a:xfrm>
+          <a:off x="0" y="0"/>
+          <a:ext cx="0" cy="0"/>
+          <a:chOff x="0" y="0"/>
+          <a:chExt cx="0" cy="0"/>
+        </a:xfrm>
+      </p:grpSpPr>
+      <p:sp>
+        <p:nvSpPr>
+          <p:cNvPr id="2" name="Espaço Reservado para Imagem de Slide 1"/>
+          <p:cNvSpPr>
+            <a:spLocks noGrp="1" noRot="1" noChangeAspect="1"/>
+          </p:cNvSpPr>
+          <p:nvPr>
+            <p:ph type="sldImg"/>
+          </p:nvPr>
+        </p:nvSpPr>
+        <p:spPr/>
+      </p:sp>
+      <p:sp>
+        <p:nvSpPr>
+          <p:cNvPr id="3" name="Espaço Reservado para Anotações 2"/>
+          <p:cNvSpPr>
+            <a:spLocks noGrp="1"/>
+          </p:cNvSpPr>
+          <p:nvPr>
+            <p:ph type="body" idx="1"/>
+          </p:nvPr>
+        </p:nvSpPr>
+        <p:spPr/>
+        <p:txBody>
+          <a:bodyPr/>
+          <a:lstStyle/>
+          <a:p>
+            <a:endParaRPr lang="pt-BR"/>
+          </a:p>
+        </p:txBody>
+      </p:sp>
+      <p:sp>
+        <p:nvSpPr>
+          <p:cNvPr id="4" name="Espaço Reservado para Número de Slide 3"/>
+          <p:cNvSpPr>
+            <a:spLocks noGrp="1"/>
+          </p:cNvSpPr>
+          <p:nvPr>
+            <p:ph type="sldNum" sz="quarter" idx="10"/>
+          </p:nvPr>
+        </p:nvSpPr>
+        <p:spPr/>
+        <p:txBody>
+          <a:bodyPr/>
+          <a:lstStyle/>
+          <a:p>
+            <a:fld id="{75D2E228-96DA-4099-BDBF-4E496F3FD30A}" type="slidenum">
+              <a:rPr lang="pt-BR" smtClean="0"/>
+              <a:pPr/>
+              <a:t>12</a:t>
+            </a:fld>
+            <a:endParaRPr lang="pt-BR"/>
+          </a:p>
+        </p:txBody>
+      </p:sp>
+    </p:spTree>
+    <p:extLst>
+      <p:ext uri="{BB962C8B-B14F-4D97-AF65-F5344CB8AC3E}">
+        <p14:creationId xmlns:p14="http://schemas.microsoft.com/office/powerpoint/2010/main" val="2821865011"/>
+      </p:ext>
+    </p:extLst>
+  </p:cSld>
+  <p:clrMapOvr>
+    <a:masterClrMapping/>
+  </p:clrMapOvr>
+</p:notes>
+</file>
+
+<file path=ppt/notesSlides/notesSlide12.xml><?xml version="1.0" encoding="utf-8"?>
+<p:notes xmlns:a="http://schemas.openxmlformats.org/drawingml/2006/main" xmlns:r="http://schemas.openxmlformats.org/officeDocument/2006/relationships" xmlns:p="http://schemas.openxmlformats.org/presentationml/2006/main">
+  <p:cSld>
+    <p:spTree>
+      <p:nvGrpSpPr>
+        <p:cNvPr id="1" name=""/>
+        <p:cNvGrpSpPr/>
+        <p:nvPr/>
+      </p:nvGrpSpPr>
+      <p:grpSpPr>
+        <a:xfrm>
+          <a:off x="0" y="0"/>
+          <a:ext cx="0" cy="0"/>
+          <a:chOff x="0" y="0"/>
+          <a:chExt cx="0" cy="0"/>
+        </a:xfrm>
+      </p:grpSpPr>
+      <p:sp>
+        <p:nvSpPr>
+          <p:cNvPr id="2" name="Espaço Reservado para Imagem de Slide 1"/>
+          <p:cNvSpPr>
+            <a:spLocks noGrp="1" noRot="1" noChangeAspect="1"/>
+          </p:cNvSpPr>
+          <p:nvPr>
+            <p:ph type="sldImg"/>
+          </p:nvPr>
+        </p:nvSpPr>
+        <p:spPr/>
+      </p:sp>
+      <p:sp>
+        <p:nvSpPr>
+          <p:cNvPr id="3" name="Espaço Reservado para Anotações 2"/>
+          <p:cNvSpPr>
+            <a:spLocks noGrp="1"/>
+          </p:cNvSpPr>
+          <p:nvPr>
+            <p:ph type="body" idx="1"/>
+          </p:nvPr>
+        </p:nvSpPr>
+        <p:spPr/>
+        <p:txBody>
+          <a:bodyPr/>
+          <a:lstStyle/>
+          <a:p>
+            <a:r>
+              <a:rPr lang="pt-BR" dirty="0" smtClean="0"/>
+              <a:t>Para automatizar os serviços é necessário se comunicar com o GSAN, nesse contexto que surge a figura do Middleware</a:t>
+            </a:r>
+            <a:endParaRPr lang="pt-BR" dirty="0"/>
+          </a:p>
+        </p:txBody>
+      </p:sp>
+      <p:sp>
+        <p:nvSpPr>
+          <p:cNvPr id="4" name="Espaço Reservado para Número de Slide 3"/>
+          <p:cNvSpPr>
+            <a:spLocks noGrp="1"/>
+          </p:cNvSpPr>
+          <p:nvPr>
+            <p:ph type="sldNum" sz="quarter" idx="10"/>
+          </p:nvPr>
+        </p:nvSpPr>
+        <p:spPr/>
+        <p:txBody>
+          <a:bodyPr/>
+          <a:lstStyle/>
+          <a:p>
+            <a:fld id="{75D2E228-96DA-4099-BDBF-4E496F3FD30A}" type="slidenum">
+              <a:rPr lang="pt-BR" smtClean="0"/>
+              <a:pPr/>
+              <a:t>13</a:t>
+            </a:fld>
+            <a:endParaRPr lang="pt-BR"/>
+          </a:p>
+        </p:txBody>
+      </p:sp>
+    </p:spTree>
+    <p:extLst>
+      <p:ext uri="{BB962C8B-B14F-4D97-AF65-F5344CB8AC3E}">
+        <p14:creationId xmlns:p14="http://schemas.microsoft.com/office/powerpoint/2010/main" val="1198062003"/>
+      </p:ext>
+    </p:extLst>
+  </p:cSld>
+  <p:clrMapOvr>
+    <a:masterClrMapping/>
+  </p:clrMapOvr>
+</p:notes>
+</file>
+
+<file path=ppt/notesSlides/notesSlide13.xml><?xml version="1.0" encoding="utf-8"?>
+<p:notes xmlns:a="http://schemas.openxmlformats.org/drawingml/2006/main" xmlns:r="http://schemas.openxmlformats.org/officeDocument/2006/relationships" xmlns:p="http://schemas.openxmlformats.org/presentationml/2006/main">
+  <p:cSld>
+    <p:spTree>
+      <p:nvGrpSpPr>
+        <p:cNvPr id="1" name=""/>
+        <p:cNvGrpSpPr/>
+        <p:nvPr/>
+      </p:nvGrpSpPr>
+      <p:grpSpPr>
+        <a:xfrm>
+          <a:off x="0" y="0"/>
+          <a:ext cx="0" cy="0"/>
+          <a:chOff x="0" y="0"/>
+          <a:chExt cx="0" cy="0"/>
+        </a:xfrm>
+      </p:grpSpPr>
+      <p:sp>
+        <p:nvSpPr>
+          <p:cNvPr id="2" name="Espaço Reservado para Imagem de Slide 1"/>
+          <p:cNvSpPr>
+            <a:spLocks noGrp="1" noRot="1" noChangeAspect="1"/>
+          </p:cNvSpPr>
+          <p:nvPr>
+            <p:ph type="sldImg"/>
+          </p:nvPr>
+        </p:nvSpPr>
+        <p:spPr/>
+      </p:sp>
+      <p:sp>
+        <p:nvSpPr>
+          <p:cNvPr id="3" name="Espaço Reservado para Anotações 2"/>
+          <p:cNvSpPr>
+            <a:spLocks noGrp="1"/>
+          </p:cNvSpPr>
+          <p:nvPr>
+            <p:ph type="body" idx="1"/>
+          </p:nvPr>
+        </p:nvSpPr>
+        <p:spPr/>
+        <p:txBody>
+          <a:bodyPr/>
+          <a:lstStyle/>
+          <a:p>
+            <a:endParaRPr lang="pt-BR"/>
+          </a:p>
+        </p:txBody>
+      </p:sp>
+      <p:sp>
+        <p:nvSpPr>
+          <p:cNvPr id="4" name="Espaço Reservado para Número de Slide 3"/>
+          <p:cNvSpPr>
+            <a:spLocks noGrp="1"/>
+          </p:cNvSpPr>
+          <p:nvPr>
+            <p:ph type="sldNum" sz="quarter" idx="10"/>
+          </p:nvPr>
+        </p:nvSpPr>
+        <p:spPr/>
+        <p:txBody>
+          <a:bodyPr/>
+          <a:lstStyle/>
+          <a:p>
+            <a:fld id="{75D2E228-96DA-4099-BDBF-4E496F3FD30A}" type="slidenum">
+              <a:rPr lang="pt-BR" smtClean="0"/>
+              <a:pPr/>
+              <a:t>14</a:t>
+            </a:fld>
+            <a:endParaRPr lang="pt-BR"/>
+          </a:p>
+        </p:txBody>
+      </p:sp>
+    </p:spTree>
+    <p:extLst>
+      <p:ext uri="{BB962C8B-B14F-4D97-AF65-F5344CB8AC3E}">
+        <p14:creationId xmlns:p14="http://schemas.microsoft.com/office/powerpoint/2010/main" val="1147254036"/>
+      </p:ext>
+    </p:extLst>
+  </p:cSld>
+  <p:clrMapOvr>
+    <a:masterClrMapping/>
+  </p:clrMapOvr>
+</p:notes>
+</file>
+
+<file path=ppt/notesSlides/notesSlide14.xml><?xml version="1.0" encoding="utf-8"?>
+<p:notes xmlns:a="http://schemas.openxmlformats.org/drawingml/2006/main" xmlns:r="http://schemas.openxmlformats.org/officeDocument/2006/relationships" xmlns:p="http://schemas.openxmlformats.org/presentationml/2006/main">
+  <p:cSld>
+    <p:spTree>
+      <p:nvGrpSpPr>
+        <p:cNvPr id="1" name=""/>
+        <p:cNvGrpSpPr/>
+        <p:nvPr/>
+      </p:nvGrpSpPr>
+      <p:grpSpPr>
+        <a:xfrm>
+          <a:off x="0" y="0"/>
+          <a:ext cx="0" cy="0"/>
+          <a:chOff x="0" y="0"/>
+          <a:chExt cx="0" cy="0"/>
+        </a:xfrm>
+      </p:grpSpPr>
+      <p:sp>
+        <p:nvSpPr>
+          <p:cNvPr id="2" name="Espaço Reservado para Imagem de Slide 1"/>
+          <p:cNvSpPr>
+            <a:spLocks noGrp="1" noRot="1" noChangeAspect="1"/>
+          </p:cNvSpPr>
+          <p:nvPr>
+            <p:ph type="sldImg"/>
+          </p:nvPr>
+        </p:nvSpPr>
+        <p:spPr/>
+      </p:sp>
+      <p:sp>
+        <p:nvSpPr>
+          <p:cNvPr id="3" name="Espaço Reservado para Anotações 2"/>
+          <p:cNvSpPr>
+            <a:spLocks noGrp="1"/>
+          </p:cNvSpPr>
+          <p:nvPr>
+            <p:ph type="body" idx="1"/>
+          </p:nvPr>
+        </p:nvSpPr>
+        <p:spPr/>
+        <p:txBody>
+          <a:bodyPr/>
+          <a:lstStyle/>
+          <a:p>
+            <a:endParaRPr lang="pt-BR"/>
+          </a:p>
+        </p:txBody>
+      </p:sp>
+      <p:sp>
+        <p:nvSpPr>
+          <p:cNvPr id="4" name="Espaço Reservado para Número de Slide 3"/>
+          <p:cNvSpPr>
+            <a:spLocks noGrp="1"/>
+          </p:cNvSpPr>
+          <p:nvPr>
+            <p:ph type="sldNum" sz="quarter" idx="10"/>
+          </p:nvPr>
+        </p:nvSpPr>
+        <p:spPr/>
+        <p:txBody>
+          <a:bodyPr/>
+          <a:lstStyle/>
+          <a:p>
+            <a:fld id="{75D2E228-96DA-4099-BDBF-4E496F3FD30A}" type="slidenum">
+              <a:rPr lang="pt-BR" smtClean="0"/>
+              <a:pPr/>
+              <a:t>15</a:t>
+            </a:fld>
+            <a:endParaRPr lang="pt-BR"/>
+          </a:p>
+        </p:txBody>
+      </p:sp>
+    </p:spTree>
+    <p:extLst>
+      <p:ext uri="{BB962C8B-B14F-4D97-AF65-F5344CB8AC3E}">
+        <p14:creationId xmlns:p14="http://schemas.microsoft.com/office/powerpoint/2010/main" val="4252540276"/>
+      </p:ext>
+    </p:extLst>
+  </p:cSld>
+  <p:clrMapOvr>
+    <a:masterClrMapping/>
+  </p:clrMapOvr>
+</p:notes>
+</file>
+
+<file path=ppt/notesSlides/notesSlide15.xml><?xml version="1.0" encoding="utf-8"?>
+<p:notes xmlns:a="http://schemas.openxmlformats.org/drawingml/2006/main" xmlns:r="http://schemas.openxmlformats.org/officeDocument/2006/relationships" xmlns:p="http://schemas.openxmlformats.org/presentationml/2006/main">
+  <p:cSld>
+    <p:spTree>
+      <p:nvGrpSpPr>
+        <p:cNvPr id="1" name=""/>
+        <p:cNvGrpSpPr/>
+        <p:nvPr/>
+      </p:nvGrpSpPr>
+      <p:grpSpPr>
+        <a:xfrm>
+          <a:off x="0" y="0"/>
+          <a:ext cx="0" cy="0"/>
+          <a:chOff x="0" y="0"/>
+          <a:chExt cx="0" cy="0"/>
+        </a:xfrm>
+      </p:grpSpPr>
+      <p:sp>
+        <p:nvSpPr>
+          <p:cNvPr id="2" name="Espaço Reservado para Imagem de Slide 1"/>
+          <p:cNvSpPr>
+            <a:spLocks noGrp="1" noRot="1" noChangeAspect="1"/>
+          </p:cNvSpPr>
+          <p:nvPr>
+            <p:ph type="sldImg"/>
+          </p:nvPr>
+        </p:nvSpPr>
+        <p:spPr/>
+      </p:sp>
+      <p:sp>
+        <p:nvSpPr>
+          <p:cNvPr id="3" name="Espaço Reservado para Anotações 2"/>
+          <p:cNvSpPr>
+            <a:spLocks noGrp="1"/>
+          </p:cNvSpPr>
+          <p:nvPr>
+            <p:ph type="body" idx="1"/>
+          </p:nvPr>
+        </p:nvSpPr>
+        <p:spPr/>
+        <p:txBody>
+          <a:bodyPr/>
+          <a:lstStyle/>
+          <a:p>
+            <a:endParaRPr lang="pt-BR" dirty="0"/>
+          </a:p>
+        </p:txBody>
+      </p:sp>
+      <p:sp>
+        <p:nvSpPr>
+          <p:cNvPr id="4" name="Espaço Reservado para Número de Slide 3"/>
+          <p:cNvSpPr>
+            <a:spLocks noGrp="1"/>
+          </p:cNvSpPr>
+          <p:nvPr>
+            <p:ph type="sldNum" sz="quarter" idx="10"/>
+          </p:nvPr>
+        </p:nvSpPr>
+        <p:spPr/>
+        <p:txBody>
+          <a:bodyPr/>
+          <a:lstStyle/>
+          <a:p>
+            <a:fld id="{75D2E228-96DA-4099-BDBF-4E496F3FD30A}" type="slidenum">
+              <a:rPr lang="pt-BR" smtClean="0"/>
+              <a:pPr/>
+              <a:t>16</a:t>
+            </a:fld>
+            <a:endParaRPr lang="pt-BR"/>
+          </a:p>
+        </p:txBody>
+      </p:sp>
+    </p:spTree>
+    <p:extLst>
+      <p:ext uri="{BB962C8B-B14F-4D97-AF65-F5344CB8AC3E}">
+        <p14:creationId xmlns:p14="http://schemas.microsoft.com/office/powerpoint/2010/main" val="1984339689"/>
+      </p:ext>
+    </p:extLst>
+  </p:cSld>
+  <p:clrMapOvr>
+    <a:masterClrMapping/>
+  </p:clrMapOvr>
+</p:notes>
+</file>
+
+<file path=ppt/notesSlides/notesSlide16.xml><?xml version="1.0" encoding="utf-8"?>
+<p:notes xmlns:a="http://schemas.openxmlformats.org/drawingml/2006/main" xmlns:r="http://schemas.openxmlformats.org/officeDocument/2006/relationships" xmlns:p="http://schemas.openxmlformats.org/presentationml/2006/main">
+  <p:cSld>
+    <p:spTree>
+      <p:nvGrpSpPr>
+        <p:cNvPr id="1" name=""/>
+        <p:cNvGrpSpPr/>
+        <p:nvPr/>
+      </p:nvGrpSpPr>
+      <p:grpSpPr>
+        <a:xfrm>
+          <a:off x="0" y="0"/>
+          <a:ext cx="0" cy="0"/>
+          <a:chOff x="0" y="0"/>
+          <a:chExt cx="0" cy="0"/>
+        </a:xfrm>
+      </p:grpSpPr>
+      <p:sp>
+        <p:nvSpPr>
+          <p:cNvPr id="2" name="Espaço Reservado para Imagem de Slide 1"/>
+          <p:cNvSpPr>
+            <a:spLocks noGrp="1" noRot="1" noChangeAspect="1"/>
+          </p:cNvSpPr>
+          <p:nvPr>
+            <p:ph type="sldImg"/>
+          </p:nvPr>
+        </p:nvSpPr>
+        <p:spPr/>
+      </p:sp>
+      <p:sp>
+        <p:nvSpPr>
+          <p:cNvPr id="3" name="Espaço Reservado para Anotações 2"/>
+          <p:cNvSpPr>
+            <a:spLocks noGrp="1"/>
+          </p:cNvSpPr>
+          <p:nvPr>
+            <p:ph type="body" idx="1"/>
+          </p:nvPr>
+        </p:nvSpPr>
+        <p:spPr/>
+        <p:txBody>
+          <a:bodyPr/>
+          <a:lstStyle/>
+          <a:p>
+            <a:endParaRPr lang="pt-BR"/>
+          </a:p>
+        </p:txBody>
+      </p:sp>
+      <p:sp>
+        <p:nvSpPr>
+          <p:cNvPr id="4" name="Espaço Reservado para Número de Slide 3"/>
+          <p:cNvSpPr>
+            <a:spLocks noGrp="1"/>
+          </p:cNvSpPr>
+          <p:nvPr>
+            <p:ph type="sldNum" sz="quarter" idx="10"/>
+          </p:nvPr>
+        </p:nvSpPr>
+        <p:spPr/>
+        <p:txBody>
+          <a:bodyPr/>
+          <a:lstStyle/>
+          <a:p>
+            <a:fld id="{75D2E228-96DA-4099-BDBF-4E496F3FD30A}" type="slidenum">
+              <a:rPr lang="pt-BR" smtClean="0"/>
+              <a:pPr/>
+              <a:t>17</a:t>
+            </a:fld>
+            <a:endParaRPr lang="pt-BR"/>
+          </a:p>
+        </p:txBody>
+      </p:sp>
+    </p:spTree>
+    <p:extLst>
+      <p:ext uri="{BB962C8B-B14F-4D97-AF65-F5344CB8AC3E}">
+        <p14:creationId xmlns:p14="http://schemas.microsoft.com/office/powerpoint/2010/main" val="1044087706"/>
+      </p:ext>
+    </p:extLst>
+  </p:cSld>
+  <p:clrMapOvr>
+    <a:masterClrMapping/>
+  </p:clrMapOvr>
+</p:notes>
+</file>
+
+<file path=ppt/notesSlides/notesSlide17.xml><?xml version="1.0" encoding="utf-8"?>
+<p:notes xmlns:a="http://schemas.openxmlformats.org/drawingml/2006/main" xmlns:r="http://schemas.openxmlformats.org/officeDocument/2006/relationships" xmlns:p="http://schemas.openxmlformats.org/presentationml/2006/main">
+  <p:cSld>
+    <p:spTree>
+      <p:nvGrpSpPr>
+        <p:cNvPr id="1" name=""/>
+        <p:cNvGrpSpPr/>
+        <p:nvPr/>
+      </p:nvGrpSpPr>
+      <p:grpSpPr>
+        <a:xfrm>
+          <a:off x="0" y="0"/>
+          <a:ext cx="0" cy="0"/>
+          <a:chOff x="0" y="0"/>
+          <a:chExt cx="0" cy="0"/>
+        </a:xfrm>
+      </p:grpSpPr>
+      <p:sp>
+        <p:nvSpPr>
+          <p:cNvPr id="2" name="Espaço Reservado para Imagem de Slide 1"/>
+          <p:cNvSpPr>
+            <a:spLocks noGrp="1" noRot="1" noChangeAspect="1"/>
+          </p:cNvSpPr>
+          <p:nvPr>
+            <p:ph type="sldImg"/>
+          </p:nvPr>
+        </p:nvSpPr>
+        <p:spPr/>
+      </p:sp>
+      <p:sp>
+        <p:nvSpPr>
+          <p:cNvPr id="3" name="Espaço Reservado para Anotações 2"/>
+          <p:cNvSpPr>
+            <a:spLocks noGrp="1"/>
+          </p:cNvSpPr>
+          <p:nvPr>
+            <p:ph type="body" idx="1"/>
+          </p:nvPr>
+        </p:nvSpPr>
+        <p:spPr/>
+        <p:txBody>
+          <a:bodyPr/>
+          <a:lstStyle/>
+          <a:p>
+            <a:endParaRPr lang="pt-BR"/>
+          </a:p>
+        </p:txBody>
+      </p:sp>
+      <p:sp>
+        <p:nvSpPr>
+          <p:cNvPr id="4" name="Espaço Reservado para Número de Slide 3"/>
+          <p:cNvSpPr>
+            <a:spLocks noGrp="1"/>
+          </p:cNvSpPr>
+          <p:nvPr>
+            <p:ph type="sldNum" sz="quarter" idx="10"/>
+          </p:nvPr>
+        </p:nvSpPr>
+        <p:spPr/>
+        <p:txBody>
+          <a:bodyPr/>
+          <a:lstStyle/>
+          <a:p>
+            <a:fld id="{75D2E228-96DA-4099-BDBF-4E496F3FD30A}" type="slidenum">
+              <a:rPr lang="pt-BR" smtClean="0"/>
+              <a:pPr/>
+              <a:t>18</a:t>
+            </a:fld>
+            <a:endParaRPr lang="pt-BR"/>
+          </a:p>
+        </p:txBody>
+      </p:sp>
+    </p:spTree>
+    <p:extLst>
+      <p:ext uri="{BB962C8B-B14F-4D97-AF65-F5344CB8AC3E}">
+        <p14:creationId xmlns:p14="http://schemas.microsoft.com/office/powerpoint/2010/main" val="1515095999"/>
+      </p:ext>
+    </p:extLst>
+  </p:cSld>
+  <p:clrMapOvr>
+    <a:masterClrMapping/>
+  </p:clrMapOvr>
+</p:notes>
+</file>
+
+<file path=ppt/notesSlides/notesSlide18.xml><?xml version="1.0" encoding="utf-8"?>
+<p:notes xmlns:a="http://schemas.openxmlformats.org/drawingml/2006/main" xmlns:r="http://schemas.openxmlformats.org/officeDocument/2006/relationships" xmlns:p="http://schemas.openxmlformats.org/presentationml/2006/main">
+  <p:cSld>
+    <p:spTree>
+      <p:nvGrpSpPr>
+        <p:cNvPr id="1" name=""/>
+        <p:cNvGrpSpPr/>
+        <p:nvPr/>
+      </p:nvGrpSpPr>
+      <p:grpSpPr>
+        <a:xfrm>
+          <a:off x="0" y="0"/>
+          <a:ext cx="0" cy="0"/>
+          <a:chOff x="0" y="0"/>
+          <a:chExt cx="0" cy="0"/>
+        </a:xfrm>
+      </p:grpSpPr>
+      <p:sp>
+        <p:nvSpPr>
+          <p:cNvPr id="2" name="Espaço Reservado para Imagem de Slide 1"/>
+          <p:cNvSpPr>
+            <a:spLocks noGrp="1" noRot="1" noChangeAspect="1"/>
+          </p:cNvSpPr>
+          <p:nvPr>
+            <p:ph type="sldImg"/>
+          </p:nvPr>
+        </p:nvSpPr>
+        <p:spPr/>
+      </p:sp>
+      <p:sp>
+        <p:nvSpPr>
+          <p:cNvPr id="3" name="Espaço Reservado para Anotações 2"/>
+          <p:cNvSpPr>
+            <a:spLocks noGrp="1"/>
+          </p:cNvSpPr>
+          <p:nvPr>
+            <p:ph type="body" idx="1"/>
+          </p:nvPr>
+        </p:nvSpPr>
+        <p:spPr/>
+        <p:txBody>
+          <a:bodyPr/>
+          <a:lstStyle/>
+          <a:p>
+            <a:endParaRPr lang="pt-BR"/>
+          </a:p>
+        </p:txBody>
+      </p:sp>
+      <p:sp>
+        <p:nvSpPr>
+          <p:cNvPr id="4" name="Espaço Reservado para Número de Slide 3"/>
+          <p:cNvSpPr>
+            <a:spLocks noGrp="1"/>
+          </p:cNvSpPr>
+          <p:nvPr>
+            <p:ph type="sldNum" sz="quarter" idx="10"/>
+          </p:nvPr>
+        </p:nvSpPr>
+        <p:spPr/>
+        <p:txBody>
+          <a:bodyPr/>
+          <a:lstStyle/>
+          <a:p>
+            <a:fld id="{75D2E228-96DA-4099-BDBF-4E496F3FD30A}" type="slidenum">
+              <a:rPr lang="pt-BR" smtClean="0"/>
+              <a:pPr/>
+              <a:t>19</a:t>
+            </a:fld>
+            <a:endParaRPr lang="pt-BR"/>
+          </a:p>
+        </p:txBody>
+      </p:sp>
+    </p:spTree>
+    <p:extLst>
+      <p:ext uri="{BB962C8B-B14F-4D97-AF65-F5344CB8AC3E}">
+        <p14:creationId xmlns:p14="http://schemas.microsoft.com/office/powerpoint/2010/main" val="4201131477"/>
+      </p:ext>
+    </p:extLst>
+  </p:cSld>
+  <p:clrMapOvr>
+    <a:masterClrMapping/>
+  </p:clrMapOvr>
+</p:notes>
+</file>
+
+<file path=ppt/notesSlides/notesSlide19.xml><?xml version="1.0" encoding="utf-8"?>
+<p:notes xmlns:a="http://schemas.openxmlformats.org/drawingml/2006/main" xmlns:r="http://schemas.openxmlformats.org/officeDocument/2006/relationships" xmlns:p="http://schemas.openxmlformats.org/presentationml/2006/main">
+  <p:cSld>
+    <p:spTree>
+      <p:nvGrpSpPr>
+        <p:cNvPr id="1" name=""/>
+        <p:cNvGrpSpPr/>
+        <p:nvPr/>
+      </p:nvGrpSpPr>
+      <p:grpSpPr>
+        <a:xfrm>
+          <a:off x="0" y="0"/>
+          <a:ext cx="0" cy="0"/>
+          <a:chOff x="0" y="0"/>
+          <a:chExt cx="0" cy="0"/>
+        </a:xfrm>
+      </p:grpSpPr>
+      <p:sp>
+        <p:nvSpPr>
+          <p:cNvPr id="2" name="Espaço Reservado para Imagem de Slide 1"/>
+          <p:cNvSpPr>
+            <a:spLocks noGrp="1" noRot="1" noChangeAspect="1"/>
+          </p:cNvSpPr>
+          <p:nvPr>
+            <p:ph type="sldImg"/>
+          </p:nvPr>
+        </p:nvSpPr>
+        <p:spPr/>
+      </p:sp>
+      <p:sp>
+        <p:nvSpPr>
+          <p:cNvPr id="3" name="Espaço Reservado para Anotações 2"/>
+          <p:cNvSpPr>
+            <a:spLocks noGrp="1"/>
+          </p:cNvSpPr>
+          <p:nvPr>
+            <p:ph type="body" idx="1"/>
+          </p:nvPr>
+        </p:nvSpPr>
+        <p:spPr/>
+        <p:txBody>
+          <a:bodyPr/>
+          <a:lstStyle/>
+          <a:p>
+            <a:endParaRPr lang="pt-BR"/>
+          </a:p>
+        </p:txBody>
+      </p:sp>
+      <p:sp>
+        <p:nvSpPr>
+          <p:cNvPr id="4" name="Espaço Reservado para Número de Slide 3"/>
+          <p:cNvSpPr>
+            <a:spLocks noGrp="1"/>
+          </p:cNvSpPr>
+          <p:nvPr>
+            <p:ph type="sldNum" sz="quarter" idx="10"/>
+          </p:nvPr>
+        </p:nvSpPr>
+        <p:spPr/>
+        <p:txBody>
+          <a:bodyPr/>
+          <a:lstStyle/>
+          <a:p>
+            <a:fld id="{75D2E228-96DA-4099-BDBF-4E496F3FD30A}" type="slidenum">
+              <a:rPr lang="pt-BR" smtClean="0"/>
+              <a:pPr/>
+              <a:t>20</a:t>
+            </a:fld>
+            <a:endParaRPr lang="pt-BR"/>
+          </a:p>
+        </p:txBody>
+      </p:sp>
+    </p:spTree>
+    <p:extLst>
+      <p:ext uri="{BB962C8B-B14F-4D97-AF65-F5344CB8AC3E}">
+        <p14:creationId xmlns:p14="http://schemas.microsoft.com/office/powerpoint/2010/main" val="117477515"/>
+      </p:ext>
+    </p:extLst>
+  </p:cSld>
+  <p:clrMapOvr>
+    <a:masterClrMapping/>
+  </p:clrMapOvr>
+</p:notes>
+</file>
+
 <file path=ppt/notesSlides/notesSlide2.xml><?xml version="1.0" encoding="utf-8"?>
+<p:notes xmlns:a="http://schemas.openxmlformats.org/drawingml/2006/main" xmlns:r="http://schemas.openxmlformats.org/officeDocument/2006/relationships" xmlns:p="http://schemas.openxmlformats.org/presentationml/2006/main">
+  <p:cSld>
+    <p:spTree>
+      <p:nvGrpSpPr>
+        <p:cNvPr id="1" name=""/>
+        <p:cNvGrpSpPr/>
+        <p:nvPr/>
+      </p:nvGrpSpPr>
+      <p:grpSpPr>
+        <a:xfrm>
+          <a:off x="0" y="0"/>
+          <a:ext cx="0" cy="0"/>
+          <a:chOff x="0" y="0"/>
+          <a:chExt cx="0" cy="0"/>
+        </a:xfrm>
+      </p:grpSpPr>
+      <p:sp>
+        <p:nvSpPr>
+          <p:cNvPr id="2" name="Espaço Reservado para Imagem de Slide 1"/>
+          <p:cNvSpPr>
+            <a:spLocks noGrp="1" noRot="1" noChangeAspect="1"/>
+          </p:cNvSpPr>
+          <p:nvPr>
+            <p:ph type="sldImg"/>
+          </p:nvPr>
+        </p:nvSpPr>
+        <p:spPr/>
+      </p:sp>
+      <p:sp>
+        <p:nvSpPr>
+          <p:cNvPr id="3" name="Espaço Reservado para Anotações 2"/>
+          <p:cNvSpPr>
+            <a:spLocks noGrp="1"/>
+          </p:cNvSpPr>
+          <p:nvPr>
+            <p:ph type="body" idx="1"/>
+          </p:nvPr>
+        </p:nvSpPr>
+        <p:spPr/>
+        <p:txBody>
+          <a:bodyPr/>
+          <a:lstStyle/>
+          <a:p>
+            <a:r>
+              <a:rPr lang="pt-BR" dirty="0" smtClean="0"/>
+              <a:t>Meio de comunicação entre o cliente – empresa.</a:t>
+            </a:r>
+          </a:p>
+          <a:p>
+            <a:r>
+              <a:rPr lang="pt-BR" dirty="0" smtClean="0"/>
+              <a:t>Input -  solicitações, melhorias, reclamações.</a:t>
+            </a:r>
+          </a:p>
+          <a:p>
+            <a:r>
+              <a:rPr lang="pt-BR" dirty="0" smtClean="0"/>
+              <a:t>Formar : Chat online, e-mail, telefone, postos de atendimento.</a:t>
+            </a:r>
+          </a:p>
+          <a:p>
+            <a:endParaRPr lang="pt-BR" dirty="0" smtClean="0"/>
+          </a:p>
+          <a:p>
+            <a:r>
+              <a:rPr lang="pt-BR" dirty="0" smtClean="0"/>
+              <a:t>Companhias são altamente demandadas pela população, por atenderem desde munícipios a estados., não tem concorrente atende todos.</a:t>
+            </a:r>
+          </a:p>
+          <a:p>
+            <a:endParaRPr lang="pt-BR" dirty="0"/>
+          </a:p>
+          <a:p>
+            <a:r>
+              <a:rPr lang="pt-BR" dirty="0" smtClean="0"/>
+              <a:t>O atendimento precisar ser + eficiente e padronizado</a:t>
+            </a:r>
+          </a:p>
+          <a:p>
+            <a:endParaRPr lang="pt-BR" dirty="0"/>
+          </a:p>
+        </p:txBody>
+      </p:sp>
+      <p:sp>
+        <p:nvSpPr>
+          <p:cNvPr id="4" name="Espaço Reservado para Número de Slide 3"/>
+          <p:cNvSpPr>
+            <a:spLocks noGrp="1"/>
+          </p:cNvSpPr>
+          <p:nvPr>
+            <p:ph type="sldNum" sz="quarter" idx="10"/>
+          </p:nvPr>
+        </p:nvSpPr>
+        <p:spPr/>
+        <p:txBody>
+          <a:bodyPr/>
+          <a:lstStyle/>
+          <a:p>
+            <a:fld id="{75D2E228-96DA-4099-BDBF-4E496F3FD30A}" type="slidenum">
+              <a:rPr lang="pt-BR" smtClean="0"/>
+              <a:pPr/>
+              <a:t>3</a:t>
+            </a:fld>
+            <a:endParaRPr lang="pt-BR"/>
+          </a:p>
+        </p:txBody>
+      </p:sp>
+    </p:spTree>
+    <p:extLst>
+      <p:ext uri="{BB962C8B-B14F-4D97-AF65-F5344CB8AC3E}">
+        <p14:creationId xmlns:p14="http://schemas.microsoft.com/office/powerpoint/2010/main" val="3416313044"/>
+      </p:ext>
+    </p:extLst>
+  </p:cSld>
+  <p:clrMapOvr>
+    <a:masterClrMapping/>
+  </p:clrMapOvr>
+</p:notes>
+</file>
+
+<file path=ppt/notesSlides/notesSlide20.xml><?xml version="1.0" encoding="utf-8"?>
+<p:notes xmlns:a="http://schemas.openxmlformats.org/drawingml/2006/main" xmlns:r="http://schemas.openxmlformats.org/officeDocument/2006/relationships" xmlns:p="http://schemas.openxmlformats.org/presentationml/2006/main">
+  <p:cSld>
+    <p:spTree>
+      <p:nvGrpSpPr>
+        <p:cNvPr id="1" name=""/>
+        <p:cNvGrpSpPr/>
+        <p:nvPr/>
+      </p:nvGrpSpPr>
+      <p:grpSpPr>
+        <a:xfrm>
+          <a:off x="0" y="0"/>
+          <a:ext cx="0" cy="0"/>
+          <a:chOff x="0" y="0"/>
+          <a:chExt cx="0" cy="0"/>
+        </a:xfrm>
+      </p:grpSpPr>
+      <p:sp>
+        <p:nvSpPr>
+          <p:cNvPr id="2" name="Espaço Reservado para Imagem de Slide 1"/>
+          <p:cNvSpPr>
+            <a:spLocks noGrp="1" noRot="1" noChangeAspect="1"/>
+          </p:cNvSpPr>
+          <p:nvPr>
+            <p:ph type="sldImg"/>
+          </p:nvPr>
+        </p:nvSpPr>
+        <p:spPr/>
+      </p:sp>
+      <p:sp>
+        <p:nvSpPr>
+          <p:cNvPr id="3" name="Espaço Reservado para Anotações 2"/>
+          <p:cNvSpPr>
+            <a:spLocks noGrp="1"/>
+          </p:cNvSpPr>
+          <p:nvPr>
+            <p:ph type="body" idx="1"/>
+          </p:nvPr>
+        </p:nvSpPr>
+        <p:spPr/>
+        <p:txBody>
+          <a:bodyPr/>
+          <a:lstStyle/>
+          <a:p>
+            <a:endParaRPr lang="pt-BR"/>
+          </a:p>
+        </p:txBody>
+      </p:sp>
+      <p:sp>
+        <p:nvSpPr>
+          <p:cNvPr id="4" name="Espaço Reservado para Número de Slide 3"/>
+          <p:cNvSpPr>
+            <a:spLocks noGrp="1"/>
+          </p:cNvSpPr>
+          <p:nvPr>
+            <p:ph type="sldNum" sz="quarter" idx="10"/>
+          </p:nvPr>
+        </p:nvSpPr>
+        <p:spPr/>
+        <p:txBody>
+          <a:bodyPr/>
+          <a:lstStyle/>
+          <a:p>
+            <a:fld id="{75D2E228-96DA-4099-BDBF-4E496F3FD30A}" type="slidenum">
+              <a:rPr lang="pt-BR" smtClean="0"/>
+              <a:pPr/>
+              <a:t>21</a:t>
+            </a:fld>
+            <a:endParaRPr lang="pt-BR"/>
+          </a:p>
+        </p:txBody>
+      </p:sp>
+    </p:spTree>
+    <p:extLst>
+      <p:ext uri="{BB962C8B-B14F-4D97-AF65-F5344CB8AC3E}">
+        <p14:creationId xmlns:p14="http://schemas.microsoft.com/office/powerpoint/2010/main" val="1676537579"/>
+      </p:ext>
+    </p:extLst>
+  </p:cSld>
+  <p:clrMapOvr>
+    <a:masterClrMapping/>
+  </p:clrMapOvr>
+</p:notes>
+</file>
+
+<file path=ppt/notesSlides/notesSlide3.xml><?xml version="1.0" encoding="utf-8"?>
+<p:notes xmlns:a="http://schemas.openxmlformats.org/drawingml/2006/main" xmlns:r="http://schemas.openxmlformats.org/officeDocument/2006/relationships" xmlns:p="http://schemas.openxmlformats.org/presentationml/2006/main">
+  <p:cSld>
+    <p:spTree>
+      <p:nvGrpSpPr>
+        <p:cNvPr id="1" name=""/>
+        <p:cNvGrpSpPr/>
+        <p:nvPr/>
+      </p:nvGrpSpPr>
+      <p:grpSpPr>
+        <a:xfrm>
+          <a:off x="0" y="0"/>
+          <a:ext cx="0" cy="0"/>
+          <a:chOff x="0" y="0"/>
+          <a:chExt cx="0" cy="0"/>
+        </a:xfrm>
+      </p:grpSpPr>
+      <p:sp>
+        <p:nvSpPr>
+          <p:cNvPr id="2" name="Espaço Reservado para Imagem de Slide 1"/>
+          <p:cNvSpPr>
+            <a:spLocks noGrp="1" noRot="1" noChangeAspect="1"/>
+          </p:cNvSpPr>
+          <p:nvPr>
+            <p:ph type="sldImg"/>
+          </p:nvPr>
+        </p:nvSpPr>
+        <p:spPr/>
+      </p:sp>
+      <p:sp>
+        <p:nvSpPr>
+          <p:cNvPr id="3" name="Espaço Reservado para Anotações 2"/>
+          <p:cNvSpPr>
+            <a:spLocks noGrp="1"/>
+          </p:cNvSpPr>
+          <p:nvPr>
+            <p:ph type="body" idx="1"/>
+          </p:nvPr>
+        </p:nvSpPr>
+        <p:spPr/>
+        <p:txBody>
+          <a:bodyPr/>
+          <a:lstStyle/>
+          <a:p>
+            <a:r>
+              <a:rPr lang="pt-BR" dirty="0" smtClean="0"/>
+              <a:t>Cliente – solicitações</a:t>
+            </a:r>
+          </a:p>
+          <a:p>
+            <a:r>
+              <a:rPr lang="pt-BR" dirty="0" smtClean="0"/>
+              <a:t>Atendentes – são responsáveis em imputar as informações ao sistema</a:t>
+            </a:r>
+          </a:p>
+          <a:p>
+            <a:r>
+              <a:rPr lang="pt-BR" dirty="0" smtClean="0"/>
+              <a:t>O sistema fornece a interface visual</a:t>
+            </a:r>
+            <a:endParaRPr lang="pt-BR" dirty="0"/>
+          </a:p>
+        </p:txBody>
+      </p:sp>
+      <p:sp>
+        <p:nvSpPr>
+          <p:cNvPr id="4" name="Espaço Reservado para Número de Slide 3"/>
+          <p:cNvSpPr>
+            <a:spLocks noGrp="1"/>
+          </p:cNvSpPr>
+          <p:nvPr>
+            <p:ph type="sldNum" sz="quarter" idx="10"/>
+          </p:nvPr>
+        </p:nvSpPr>
+        <p:spPr/>
+        <p:txBody>
+          <a:bodyPr/>
+          <a:lstStyle/>
+          <a:p>
+            <a:fld id="{75D2E228-96DA-4099-BDBF-4E496F3FD30A}" type="slidenum">
+              <a:rPr lang="pt-BR" smtClean="0"/>
+              <a:pPr/>
+              <a:t>4</a:t>
+            </a:fld>
+            <a:endParaRPr lang="pt-BR"/>
+          </a:p>
+        </p:txBody>
+      </p:sp>
+    </p:spTree>
+    <p:extLst>
+      <p:ext uri="{BB962C8B-B14F-4D97-AF65-F5344CB8AC3E}">
+        <p14:creationId xmlns:p14="http://schemas.microsoft.com/office/powerpoint/2010/main" val="416397316"/>
+      </p:ext>
+    </p:extLst>
+  </p:cSld>
+  <p:clrMapOvr>
+    <a:masterClrMapping/>
+  </p:clrMapOvr>
+</p:notes>
+</file>
+
+<file path=ppt/notesSlides/notesSlide4.xml><?xml version="1.0" encoding="utf-8"?>
+<p:notes xmlns:a="http://schemas.openxmlformats.org/drawingml/2006/main" xmlns:r="http://schemas.openxmlformats.org/officeDocument/2006/relationships" xmlns:p="http://schemas.openxmlformats.org/presentationml/2006/main">
+  <p:cSld>
+    <p:spTree>
+      <p:nvGrpSpPr>
+        <p:cNvPr id="1" name=""/>
+        <p:cNvGrpSpPr/>
+        <p:nvPr/>
+      </p:nvGrpSpPr>
+      <p:grpSpPr>
+        <a:xfrm>
+          <a:off x="0" y="0"/>
+          <a:ext cx="0" cy="0"/>
+          <a:chOff x="0" y="0"/>
+          <a:chExt cx="0" cy="0"/>
+        </a:xfrm>
+      </p:grpSpPr>
+      <p:sp>
+        <p:nvSpPr>
+          <p:cNvPr id="2" name="Espaço Reservado para Imagem de Slide 1"/>
+          <p:cNvSpPr>
+            <a:spLocks noGrp="1" noRot="1" noChangeAspect="1"/>
+          </p:cNvSpPr>
+          <p:nvPr>
+            <p:ph type="sldImg"/>
+          </p:nvPr>
+        </p:nvSpPr>
+        <p:spPr/>
+      </p:sp>
+      <p:sp>
+        <p:nvSpPr>
+          <p:cNvPr id="3" name="Espaço Reservado para Anotações 2"/>
+          <p:cNvSpPr>
+            <a:spLocks noGrp="1"/>
+          </p:cNvSpPr>
+          <p:nvPr>
+            <p:ph type="body" idx="1"/>
+          </p:nvPr>
+        </p:nvSpPr>
+        <p:spPr/>
+        <p:txBody>
+          <a:bodyPr/>
+          <a:lstStyle/>
+          <a:p>
+            <a:endParaRPr lang="pt-BR" dirty="0"/>
+          </a:p>
+        </p:txBody>
+      </p:sp>
+      <p:sp>
+        <p:nvSpPr>
+          <p:cNvPr id="4" name="Espaço Reservado para Número de Slide 3"/>
+          <p:cNvSpPr>
+            <a:spLocks noGrp="1"/>
+          </p:cNvSpPr>
+          <p:nvPr>
+            <p:ph type="sldNum" sz="quarter" idx="10"/>
+          </p:nvPr>
+        </p:nvSpPr>
+        <p:spPr/>
+        <p:txBody>
+          <a:bodyPr/>
+          <a:lstStyle/>
+          <a:p>
+            <a:fld id="{75D2E228-96DA-4099-BDBF-4E496F3FD30A}" type="slidenum">
+              <a:rPr lang="pt-BR" smtClean="0"/>
+              <a:pPr/>
+              <a:t>5</a:t>
+            </a:fld>
+            <a:endParaRPr lang="pt-BR"/>
+          </a:p>
+        </p:txBody>
+      </p:sp>
+    </p:spTree>
+    <p:extLst>
+      <p:ext uri="{BB962C8B-B14F-4D97-AF65-F5344CB8AC3E}">
+        <p14:creationId xmlns:p14="http://schemas.microsoft.com/office/powerpoint/2010/main" val="4194629090"/>
+      </p:ext>
+    </p:extLst>
+  </p:cSld>
+  <p:clrMapOvr>
+    <a:masterClrMapping/>
+  </p:clrMapOvr>
+</p:notes>
+</file>
+
+<file path=ppt/notesSlides/notesSlide5.xml><?xml version="1.0" encoding="utf-8"?>
 <p:notes xmlns:a="http://schemas.openxmlformats.org/drawingml/2006/main" xmlns:r="http://schemas.openxmlformats.org/officeDocument/2006/relationships" xmlns:p="http://schemas.openxmlformats.org/presentationml/2006/main">
   <p:cSld>
     <p:spTree>
@@ -18323,6 +19569,378 @@
     <p:extLst>
       <p:ext uri="{BB962C8B-B14F-4D97-AF65-F5344CB8AC3E}">
         <p14:creationId xmlns:p14="http://schemas.microsoft.com/office/powerpoint/2010/main" val="3296922919"/>
+      </p:ext>
+    </p:extLst>
+  </p:cSld>
+  <p:clrMapOvr>
+    <a:masterClrMapping/>
+  </p:clrMapOvr>
+</p:notes>
+</file>
+
+<file path=ppt/notesSlides/notesSlide6.xml><?xml version="1.0" encoding="utf-8"?>
+<p:notes xmlns:a="http://schemas.openxmlformats.org/drawingml/2006/main" xmlns:r="http://schemas.openxmlformats.org/officeDocument/2006/relationships" xmlns:p="http://schemas.openxmlformats.org/presentationml/2006/main">
+  <p:cSld>
+    <p:spTree>
+      <p:nvGrpSpPr>
+        <p:cNvPr id="1" name=""/>
+        <p:cNvGrpSpPr/>
+        <p:nvPr/>
+      </p:nvGrpSpPr>
+      <p:grpSpPr>
+        <a:xfrm>
+          <a:off x="0" y="0"/>
+          <a:ext cx="0" cy="0"/>
+          <a:chOff x="0" y="0"/>
+          <a:chExt cx="0" cy="0"/>
+        </a:xfrm>
+      </p:grpSpPr>
+      <p:sp>
+        <p:nvSpPr>
+          <p:cNvPr id="2" name="Espaço Reservado para Imagem de Slide 1"/>
+          <p:cNvSpPr>
+            <a:spLocks noGrp="1" noRot="1" noChangeAspect="1"/>
+          </p:cNvSpPr>
+          <p:nvPr>
+            <p:ph type="sldImg"/>
+          </p:nvPr>
+        </p:nvSpPr>
+        <p:spPr/>
+      </p:sp>
+      <p:sp>
+        <p:nvSpPr>
+          <p:cNvPr id="3" name="Espaço Reservado para Anotações 2"/>
+          <p:cNvSpPr>
+            <a:spLocks noGrp="1"/>
+          </p:cNvSpPr>
+          <p:nvPr>
+            <p:ph type="body" idx="1"/>
+          </p:nvPr>
+        </p:nvSpPr>
+        <p:spPr/>
+        <p:txBody>
+          <a:bodyPr/>
+          <a:lstStyle/>
+          <a:p>
+            <a:endParaRPr lang="pt-BR"/>
+          </a:p>
+        </p:txBody>
+      </p:sp>
+      <p:sp>
+        <p:nvSpPr>
+          <p:cNvPr id="4" name="Espaço Reservado para Número de Slide 3"/>
+          <p:cNvSpPr>
+            <a:spLocks noGrp="1"/>
+          </p:cNvSpPr>
+          <p:nvPr>
+            <p:ph type="sldNum" sz="quarter" idx="10"/>
+          </p:nvPr>
+        </p:nvSpPr>
+        <p:spPr/>
+        <p:txBody>
+          <a:bodyPr/>
+          <a:lstStyle/>
+          <a:p>
+            <a:fld id="{75D2E228-96DA-4099-BDBF-4E496F3FD30A}" type="slidenum">
+              <a:rPr lang="pt-BR" smtClean="0"/>
+              <a:pPr/>
+              <a:t>7</a:t>
+            </a:fld>
+            <a:endParaRPr lang="pt-BR"/>
+          </a:p>
+        </p:txBody>
+      </p:sp>
+    </p:spTree>
+    <p:extLst>
+      <p:ext uri="{BB962C8B-B14F-4D97-AF65-F5344CB8AC3E}">
+        <p14:creationId xmlns:p14="http://schemas.microsoft.com/office/powerpoint/2010/main" val="3126551505"/>
+      </p:ext>
+    </p:extLst>
+  </p:cSld>
+  <p:clrMapOvr>
+    <a:masterClrMapping/>
+  </p:clrMapOvr>
+</p:notes>
+</file>
+
+<file path=ppt/notesSlides/notesSlide7.xml><?xml version="1.0" encoding="utf-8"?>
+<p:notes xmlns:a="http://schemas.openxmlformats.org/drawingml/2006/main" xmlns:r="http://schemas.openxmlformats.org/officeDocument/2006/relationships" xmlns:p="http://schemas.openxmlformats.org/presentationml/2006/main">
+  <p:cSld>
+    <p:spTree>
+      <p:nvGrpSpPr>
+        <p:cNvPr id="1" name=""/>
+        <p:cNvGrpSpPr/>
+        <p:nvPr/>
+      </p:nvGrpSpPr>
+      <p:grpSpPr>
+        <a:xfrm>
+          <a:off x="0" y="0"/>
+          <a:ext cx="0" cy="0"/>
+          <a:chOff x="0" y="0"/>
+          <a:chExt cx="0" cy="0"/>
+        </a:xfrm>
+      </p:grpSpPr>
+      <p:sp>
+        <p:nvSpPr>
+          <p:cNvPr id="2" name="Espaço Reservado para Imagem de Slide 1"/>
+          <p:cNvSpPr>
+            <a:spLocks noGrp="1" noRot="1" noChangeAspect="1"/>
+          </p:cNvSpPr>
+          <p:nvPr>
+            <p:ph type="sldImg"/>
+          </p:nvPr>
+        </p:nvSpPr>
+        <p:spPr/>
+      </p:sp>
+      <p:sp>
+        <p:nvSpPr>
+          <p:cNvPr id="3" name="Espaço Reservado para Anotações 2"/>
+          <p:cNvSpPr>
+            <a:spLocks noGrp="1"/>
+          </p:cNvSpPr>
+          <p:nvPr>
+            <p:ph type="body" idx="1"/>
+          </p:nvPr>
+        </p:nvSpPr>
+        <p:spPr/>
+        <p:txBody>
+          <a:bodyPr/>
+          <a:lstStyle/>
+          <a:p>
+            <a:endParaRPr lang="pt-BR"/>
+          </a:p>
+        </p:txBody>
+      </p:sp>
+      <p:sp>
+        <p:nvSpPr>
+          <p:cNvPr id="4" name="Espaço Reservado para Número de Slide 3"/>
+          <p:cNvSpPr>
+            <a:spLocks noGrp="1"/>
+          </p:cNvSpPr>
+          <p:nvPr>
+            <p:ph type="sldNum" sz="quarter" idx="10"/>
+          </p:nvPr>
+        </p:nvSpPr>
+        <p:spPr/>
+        <p:txBody>
+          <a:bodyPr/>
+          <a:lstStyle/>
+          <a:p>
+            <a:fld id="{75D2E228-96DA-4099-BDBF-4E496F3FD30A}" type="slidenum">
+              <a:rPr lang="pt-BR" smtClean="0"/>
+              <a:pPr/>
+              <a:t>8</a:t>
+            </a:fld>
+            <a:endParaRPr lang="pt-BR"/>
+          </a:p>
+        </p:txBody>
+      </p:sp>
+    </p:spTree>
+    <p:extLst>
+      <p:ext uri="{BB962C8B-B14F-4D97-AF65-F5344CB8AC3E}">
+        <p14:creationId xmlns:p14="http://schemas.microsoft.com/office/powerpoint/2010/main" val="192708133"/>
+      </p:ext>
+    </p:extLst>
+  </p:cSld>
+  <p:clrMapOvr>
+    <a:masterClrMapping/>
+  </p:clrMapOvr>
+</p:notes>
+</file>
+
+<file path=ppt/notesSlides/notesSlide8.xml><?xml version="1.0" encoding="utf-8"?>
+<p:notes xmlns:a="http://schemas.openxmlformats.org/drawingml/2006/main" xmlns:r="http://schemas.openxmlformats.org/officeDocument/2006/relationships" xmlns:p="http://schemas.openxmlformats.org/presentationml/2006/main">
+  <p:cSld>
+    <p:spTree>
+      <p:nvGrpSpPr>
+        <p:cNvPr id="1" name=""/>
+        <p:cNvGrpSpPr/>
+        <p:nvPr/>
+      </p:nvGrpSpPr>
+      <p:grpSpPr>
+        <a:xfrm>
+          <a:off x="0" y="0"/>
+          <a:ext cx="0" cy="0"/>
+          <a:chOff x="0" y="0"/>
+          <a:chExt cx="0" cy="0"/>
+        </a:xfrm>
+      </p:grpSpPr>
+      <p:sp>
+        <p:nvSpPr>
+          <p:cNvPr id="2" name="Espaço Reservado para Imagem de Slide 1"/>
+          <p:cNvSpPr>
+            <a:spLocks noGrp="1" noRot="1" noChangeAspect="1"/>
+          </p:cNvSpPr>
+          <p:nvPr>
+            <p:ph type="sldImg"/>
+          </p:nvPr>
+        </p:nvSpPr>
+        <p:spPr/>
+      </p:sp>
+      <p:sp>
+        <p:nvSpPr>
+          <p:cNvPr id="3" name="Espaço Reservado para Anotações 2"/>
+          <p:cNvSpPr>
+            <a:spLocks noGrp="1"/>
+          </p:cNvSpPr>
+          <p:nvPr>
+            <p:ph type="body" idx="1"/>
+          </p:nvPr>
+        </p:nvSpPr>
+        <p:spPr/>
+        <p:txBody>
+          <a:bodyPr/>
+          <a:lstStyle/>
+          <a:p>
+            <a:r>
+              <a:rPr lang="pt-BR" dirty="0" smtClean="0"/>
+              <a:t>Basicamente dois </a:t>
+            </a:r>
+            <a:r>
+              <a:rPr lang="pt-BR" dirty="0" err="1" smtClean="0"/>
+              <a:t>conteiners</a:t>
+            </a:r>
+            <a:r>
+              <a:rPr lang="pt-BR" dirty="0" smtClean="0"/>
+              <a:t> que representam 2 sistemas operacionais diferentes.</a:t>
+            </a:r>
+          </a:p>
+          <a:p>
+            <a:r>
+              <a:rPr lang="pt-BR" dirty="0" smtClean="0"/>
+              <a:t>1 – Aplicação com as rotinas de </a:t>
+            </a:r>
+            <a:r>
+              <a:rPr lang="pt-BR" dirty="0" err="1" smtClean="0"/>
+              <a:t>call</a:t>
+            </a:r>
+            <a:r>
+              <a:rPr lang="pt-BR" dirty="0" smtClean="0"/>
+              <a:t> center.</a:t>
+            </a:r>
+          </a:p>
+          <a:p>
+            <a:r>
+              <a:rPr lang="pt-BR" dirty="0" smtClean="0"/>
+              <a:t>2 – Aplicação do GSAN já existente hoje nas companhias.</a:t>
+            </a:r>
+            <a:endParaRPr lang="pt-BR" dirty="0"/>
+          </a:p>
+        </p:txBody>
+      </p:sp>
+      <p:sp>
+        <p:nvSpPr>
+          <p:cNvPr id="4" name="Espaço Reservado para Número de Slide 3"/>
+          <p:cNvSpPr>
+            <a:spLocks noGrp="1"/>
+          </p:cNvSpPr>
+          <p:nvPr>
+            <p:ph type="sldNum" sz="quarter" idx="10"/>
+          </p:nvPr>
+        </p:nvSpPr>
+        <p:spPr/>
+        <p:txBody>
+          <a:bodyPr/>
+          <a:lstStyle/>
+          <a:p>
+            <a:fld id="{75D2E228-96DA-4099-BDBF-4E496F3FD30A}" type="slidenum">
+              <a:rPr lang="pt-BR" smtClean="0"/>
+              <a:pPr/>
+              <a:t>9</a:t>
+            </a:fld>
+            <a:endParaRPr lang="pt-BR"/>
+          </a:p>
+        </p:txBody>
+      </p:sp>
+    </p:spTree>
+    <p:extLst>
+      <p:ext uri="{BB962C8B-B14F-4D97-AF65-F5344CB8AC3E}">
+        <p14:creationId xmlns:p14="http://schemas.microsoft.com/office/powerpoint/2010/main" val="4216879617"/>
+      </p:ext>
+    </p:extLst>
+  </p:cSld>
+  <p:clrMapOvr>
+    <a:masterClrMapping/>
+  </p:clrMapOvr>
+</p:notes>
+</file>
+
+<file path=ppt/notesSlides/notesSlide9.xml><?xml version="1.0" encoding="utf-8"?>
+<p:notes xmlns:a="http://schemas.openxmlformats.org/drawingml/2006/main" xmlns:r="http://schemas.openxmlformats.org/officeDocument/2006/relationships" xmlns:p="http://schemas.openxmlformats.org/presentationml/2006/main">
+  <p:cSld>
+    <p:spTree>
+      <p:nvGrpSpPr>
+        <p:cNvPr id="1" name=""/>
+        <p:cNvGrpSpPr/>
+        <p:nvPr/>
+      </p:nvGrpSpPr>
+      <p:grpSpPr>
+        <a:xfrm>
+          <a:off x="0" y="0"/>
+          <a:ext cx="0" cy="0"/>
+          <a:chOff x="0" y="0"/>
+          <a:chExt cx="0" cy="0"/>
+        </a:xfrm>
+      </p:grpSpPr>
+      <p:sp>
+        <p:nvSpPr>
+          <p:cNvPr id="2" name="Espaço Reservado para Imagem de Slide 1"/>
+          <p:cNvSpPr>
+            <a:spLocks noGrp="1" noRot="1" noChangeAspect="1"/>
+          </p:cNvSpPr>
+          <p:nvPr>
+            <p:ph type="sldImg"/>
+          </p:nvPr>
+        </p:nvSpPr>
+        <p:spPr/>
+      </p:sp>
+      <p:sp>
+        <p:nvSpPr>
+          <p:cNvPr id="3" name="Espaço Reservado para Anotações 2"/>
+          <p:cNvSpPr>
+            <a:spLocks noGrp="1"/>
+          </p:cNvSpPr>
+          <p:nvPr>
+            <p:ph type="body" idx="1"/>
+          </p:nvPr>
+        </p:nvSpPr>
+        <p:spPr/>
+        <p:txBody>
+          <a:bodyPr/>
+          <a:lstStyle/>
+          <a:p>
+            <a:endParaRPr lang="pt-BR"/>
+          </a:p>
+        </p:txBody>
+      </p:sp>
+      <p:sp>
+        <p:nvSpPr>
+          <p:cNvPr id="4" name="Espaço Reservado para Número de Slide 3"/>
+          <p:cNvSpPr>
+            <a:spLocks noGrp="1"/>
+          </p:cNvSpPr>
+          <p:nvPr>
+            <p:ph type="sldNum" sz="quarter" idx="10"/>
+          </p:nvPr>
+        </p:nvSpPr>
+        <p:spPr/>
+        <p:txBody>
+          <a:bodyPr/>
+          <a:lstStyle/>
+          <a:p>
+            <a:fld id="{75D2E228-96DA-4099-BDBF-4E496F3FD30A}" type="slidenum">
+              <a:rPr lang="pt-BR" smtClean="0"/>
+              <a:pPr/>
+              <a:t>10</a:t>
+            </a:fld>
+            <a:endParaRPr lang="pt-BR"/>
+          </a:p>
+        </p:txBody>
+      </p:sp>
+    </p:spTree>
+    <p:extLst>
+      <p:ext uri="{BB962C8B-B14F-4D97-AF65-F5344CB8AC3E}">
+        <p14:creationId xmlns:p14="http://schemas.microsoft.com/office/powerpoint/2010/main" val="1628602933"/>
       </p:ext>
     </p:extLst>
   </p:cSld>
@@ -18521,7 +20139,7 @@
             <a:fld id="{2FCF2DF0-B8F9-4079-8E40-187FAF0DE240}" type="datetime1">
               <a:rPr lang="pt-BR" smtClean="0"/>
               <a:pPr/>
-              <a:t>07/12/2015</a:t>
+              <a:t>08/12/2015</a:t>
             </a:fld>
             <a:endParaRPr lang="pt-BR"/>
           </a:p>
@@ -18861,7 +20479,7 @@
             <a:fld id="{8D505163-7E65-4B85-83F1-07382F4D833F}" type="datetime1">
               <a:rPr lang="pt-BR" smtClean="0"/>
               <a:pPr/>
-              <a:t>07/12/2015</a:t>
+              <a:t>08/12/2015</a:t>
             </a:fld>
             <a:endParaRPr lang="pt-BR"/>
           </a:p>
@@ -19264,7 +20882,7 @@
             <a:fld id="{47C7CE0E-0CA5-4B56-925C-79B79E0969DD}" type="datetime1">
               <a:rPr lang="pt-BR" smtClean="0"/>
               <a:pPr/>
-              <a:t>07/12/2015</a:t>
+              <a:t>08/12/2015</a:t>
             </a:fld>
             <a:endParaRPr lang="pt-BR"/>
           </a:p>
@@ -19602,7 +21220,7 @@
             <a:fld id="{2D56CCD9-FA26-4000-8F6D-E95D47EDF094}" type="datetime1">
               <a:rPr lang="pt-BR" smtClean="0"/>
               <a:pPr/>
-              <a:t>07/12/2015</a:t>
+              <a:t>08/12/2015</a:t>
             </a:fld>
             <a:endParaRPr lang="pt-BR"/>
           </a:p>
@@ -19924,7 +21542,7 @@
             <a:fld id="{0BF55ADD-D37E-4BEE-9594-CC48854CF84E}" type="datetime1">
               <a:rPr lang="pt-BR" smtClean="0"/>
               <a:pPr/>
-              <a:t>07/12/2015</a:t>
+              <a:t>08/12/2015</a:t>
             </a:fld>
             <a:endParaRPr lang="pt-BR"/>
           </a:p>
@@ -20322,7 +21940,7 @@
             <a:fld id="{35B5249D-A14D-402F-A791-DF5914767B08}" type="datetime1">
               <a:rPr lang="pt-BR" smtClean="0"/>
               <a:pPr/>
-              <a:t>07/12/2015</a:t>
+              <a:t>08/12/2015</a:t>
             </a:fld>
             <a:endParaRPr lang="pt-BR"/>
           </a:p>
@@ -20581,7 +22199,7 @@
             <a:fld id="{83958224-D0A1-4307-BFC6-87D8577A834D}" type="datetime1">
               <a:rPr lang="pt-BR" smtClean="0"/>
               <a:pPr/>
-              <a:t>07/12/2015</a:t>
+              <a:t>08/12/2015</a:t>
             </a:fld>
             <a:endParaRPr lang="pt-BR"/>
           </a:p>
@@ -20845,7 +22463,7 @@
             <a:fld id="{F868352E-7289-4F45-AA26-CCCB19D4B7F2}" type="datetime1">
               <a:rPr lang="pt-BR" smtClean="0"/>
               <a:pPr/>
-              <a:t>07/12/2015</a:t>
+              <a:t>08/12/2015</a:t>
             </a:fld>
             <a:endParaRPr lang="pt-BR"/>
           </a:p>
@@ -21109,7 +22727,7 @@
             <a:fld id="{F515360A-50F4-447F-B400-332B8D5DAD89}" type="datetime1">
               <a:rPr lang="pt-BR" smtClean="0"/>
               <a:pPr/>
-              <a:t>07/12/2015</a:t>
+              <a:t>08/12/2015</a:t>
             </a:fld>
             <a:endParaRPr lang="pt-BR"/>
           </a:p>
@@ -21440,7 +23058,7 @@
             <a:fld id="{1CE5A6AF-B30B-42B4-B30B-3F371AE91A76}" type="datetime1">
               <a:rPr lang="pt-BR" smtClean="0"/>
               <a:pPr/>
-              <a:t>07/12/2015</a:t>
+              <a:t>08/12/2015</a:t>
             </a:fld>
             <a:endParaRPr lang="pt-BR"/>
           </a:p>
@@ -21765,7 +23383,7 @@
             <a:fld id="{607A222D-B987-489E-B5BA-FDFE2E5ADEE0}" type="datetime1">
               <a:rPr lang="pt-BR" smtClean="0"/>
               <a:pPr/>
-              <a:t>07/12/2015</a:t>
+              <a:t>08/12/2015</a:t>
             </a:fld>
             <a:endParaRPr lang="pt-BR"/>
           </a:p>
@@ -22224,7 +23842,7 @@
             <a:fld id="{10864336-13F5-412D-AAA7-D0441BE533BD}" type="datetime1">
               <a:rPr lang="pt-BR" smtClean="0"/>
               <a:pPr/>
-              <a:t>07/12/2015</a:t>
+              <a:t>08/12/2015</a:t>
             </a:fld>
             <a:endParaRPr lang="pt-BR"/>
           </a:p>
@@ -22431,7 +24049,7 @@
             <a:fld id="{8F911E89-5FFA-48F7-911D-07F512305D1A}" type="datetime1">
               <a:rPr lang="pt-BR" smtClean="0"/>
               <a:pPr/>
-              <a:t>07/12/2015</a:t>
+              <a:t>08/12/2015</a:t>
             </a:fld>
             <a:endParaRPr lang="pt-BR"/>
           </a:p>
@@ -22610,7 +24228,7 @@
             <a:fld id="{FB04ED74-4A8A-43F9-83CC-2CD031055ACB}" type="datetime1">
               <a:rPr lang="pt-BR" smtClean="0"/>
               <a:pPr/>
-              <a:t>07/12/2015</a:t>
+              <a:t>08/12/2015</a:t>
             </a:fld>
             <a:endParaRPr lang="pt-BR"/>
           </a:p>
@@ -22945,7 +24563,7 @@
             <a:fld id="{16F5658E-FB88-4DAA-B1C4-84ED68FAE92D}" type="datetime1">
               <a:rPr lang="pt-BR" smtClean="0"/>
               <a:pPr/>
-              <a:t>07/12/2015</a:t>
+              <a:t>08/12/2015</a:t>
             </a:fld>
             <a:endParaRPr lang="pt-BR"/>
           </a:p>
@@ -23292,7 +24910,7 @@
             <a:fld id="{CDF77102-3CEF-4C81-9B0E-2B4A8208C4C4}" type="datetime1">
               <a:rPr lang="pt-BR" smtClean="0"/>
               <a:pPr/>
-              <a:t>07/12/2015</a:t>
+              <a:t>08/12/2015</a:t>
             </a:fld>
             <a:endParaRPr lang="pt-BR"/>
           </a:p>
@@ -25411,7 +27029,7 @@
             <a:fld id="{5031F1EC-D74F-4658-9891-496CCA035D09}" type="datetime1">
               <a:rPr lang="pt-BR" smtClean="0"/>
               <a:pPr/>
-              <a:t>07/12/2015</a:t>
+              <a:t>08/12/2015</a:t>
             </a:fld>
             <a:endParaRPr lang="pt-BR"/>
           </a:p>
@@ -26309,7 +27927,7 @@
             <a:fld id="{F515360A-50F4-447F-B400-332B8D5DAD89}" type="datetime1">
               <a:rPr lang="pt-BR" smtClean="0"/>
               <a:pPr/>
-              <a:t>07/12/2015</a:t>
+              <a:t>08/12/2015</a:t>
             </a:fld>
             <a:endParaRPr lang="pt-BR"/>
           </a:p>
@@ -26348,7 +27966,7 @@
           <p:nvPr/>
         </p:nvPicPr>
         <p:blipFill>
-          <a:blip r:embed="rId2">
+          <a:blip r:embed="rId3">
             <a:extLst>
               <a:ext uri="{28A0092B-C50C-407E-A947-70E740481C1C}">
                 <a14:useLocalDpi xmlns:a14="http://schemas.microsoft.com/office/drawing/2010/main" val="0"/>
@@ -26516,7 +28134,7 @@
             <a:fld id="{F515360A-50F4-447F-B400-332B8D5DAD89}" type="datetime1">
               <a:rPr lang="pt-BR" smtClean="0"/>
               <a:pPr/>
-              <a:t>07/12/2015</a:t>
+              <a:t>08/12/2015</a:t>
             </a:fld>
             <a:endParaRPr lang="pt-BR"/>
           </a:p>
@@ -26555,7 +28173,7 @@
           <p:nvPr/>
         </p:nvPicPr>
         <p:blipFill>
-          <a:blip r:embed="rId2">
+          <a:blip r:embed="rId3">
             <a:extLst>
               <a:ext uri="{28A0092B-C50C-407E-A947-70E740481C1C}">
                 <a14:useLocalDpi xmlns:a14="http://schemas.microsoft.com/office/drawing/2010/main" val="0"/>
@@ -26657,7 +28275,7 @@
             <a:fld id="{F515360A-50F4-447F-B400-332B8D5DAD89}" type="datetime1">
               <a:rPr lang="pt-BR" smtClean="0"/>
               <a:pPr/>
-              <a:t>07/12/2015</a:t>
+              <a:t>08/12/2015</a:t>
             </a:fld>
             <a:endParaRPr lang="pt-BR"/>
           </a:p>
@@ -26793,7 +28411,7 @@
           <p:nvPr/>
         </p:nvPicPr>
         <p:blipFill>
-          <a:blip r:embed="rId2">
+          <a:blip r:embed="rId3">
             <a:extLst>
               <a:ext uri="{28A0092B-C50C-407E-A947-70E740481C1C}">
                 <a14:useLocalDpi xmlns:a14="http://schemas.microsoft.com/office/drawing/2010/main" val="0"/>
@@ -27000,7 +28618,7 @@
             <a:fld id="{F515360A-50F4-447F-B400-332B8D5DAD89}" type="datetime1">
               <a:rPr lang="pt-BR" smtClean="0"/>
               <a:pPr/>
-              <a:t>07/12/2015</a:t>
+              <a:t>08/12/2015</a:t>
             </a:fld>
             <a:endParaRPr lang="pt-BR"/>
           </a:p>
@@ -27039,7 +28657,7 @@
           <p:nvPr/>
         </p:nvPicPr>
         <p:blipFill>
-          <a:blip r:embed="rId2">
+          <a:blip r:embed="rId3">
             <a:extLst>
               <a:ext uri="{28A0092B-C50C-407E-A947-70E740481C1C}">
                 <a14:useLocalDpi xmlns:a14="http://schemas.microsoft.com/office/drawing/2010/main" val="0"/>
@@ -27200,7 +28818,7 @@
             <a:fld id="{F515360A-50F4-447F-B400-332B8D5DAD89}" type="datetime1">
               <a:rPr lang="pt-BR" smtClean="0"/>
               <a:pPr/>
-              <a:t>07/12/2015</a:t>
+              <a:t>08/12/2015</a:t>
             </a:fld>
             <a:endParaRPr lang="pt-BR"/>
           </a:p>
@@ -27239,7 +28857,7 @@
           <p:nvPr/>
         </p:nvPicPr>
         <p:blipFill>
-          <a:blip r:embed="rId2">
+          <a:blip r:embed="rId3">
             <a:extLst>
               <a:ext uri="{28A0092B-C50C-407E-A947-70E740481C1C}">
                 <a14:useLocalDpi xmlns:a14="http://schemas.microsoft.com/office/drawing/2010/main" val="0"/>
@@ -27336,7 +28954,7 @@
             <a:fld id="{F515360A-50F4-447F-B400-332B8D5DAD89}" type="datetime1">
               <a:rPr lang="pt-BR" smtClean="0"/>
               <a:pPr/>
-              <a:t>07/12/2015</a:t>
+              <a:t>08/12/2015</a:t>
             </a:fld>
             <a:endParaRPr lang="pt-BR" dirty="0"/>
           </a:p>
@@ -27375,7 +28993,7 @@
           <p:nvPr/>
         </p:nvPicPr>
         <p:blipFill>
-          <a:blip r:embed="rId2" cstate="print"/>
+          <a:blip r:embed="rId3" cstate="print"/>
           <a:srcRect/>
           <a:stretch>
             <a:fillRect/>
@@ -27440,7 +29058,7 @@
           <p:nvPr/>
         </p:nvPicPr>
         <p:blipFill>
-          <a:blip r:embed="rId3">
+          <a:blip r:embed="rId4">
             <a:extLst>
               <a:ext uri="{28A0092B-C50C-407E-A947-70E740481C1C}">
                 <a14:useLocalDpi xmlns:a14="http://schemas.microsoft.com/office/drawing/2010/main" val="0"/>
@@ -27537,7 +29155,7 @@
             <a:fld id="{F515360A-50F4-447F-B400-332B8D5DAD89}" type="datetime1">
               <a:rPr lang="pt-BR" smtClean="0"/>
               <a:pPr/>
-              <a:t>07/12/2015</a:t>
+              <a:t>08/12/2015</a:t>
             </a:fld>
             <a:endParaRPr lang="pt-BR" dirty="0"/>
           </a:p>
@@ -27614,7 +29232,7 @@
           <p:nvPr/>
         </p:nvPicPr>
         <p:blipFill>
-          <a:blip r:embed="rId2">
+          <a:blip r:embed="rId3">
             <a:extLst>
               <a:ext uri="{28A0092B-C50C-407E-A947-70E740481C1C}">
                 <a14:useLocalDpi xmlns:a14="http://schemas.microsoft.com/office/drawing/2010/main" val="0"/>
@@ -27767,7 +29385,7 @@
             <a:fld id="{F515360A-50F4-447F-B400-332B8D5DAD89}" type="datetime1">
               <a:rPr lang="pt-BR" smtClean="0"/>
               <a:pPr/>
-              <a:t>07/12/2015</a:t>
+              <a:t>08/12/2015</a:t>
             </a:fld>
             <a:endParaRPr lang="pt-BR"/>
           </a:p>
@@ -27806,7 +29424,7 @@
           <p:nvPr/>
         </p:nvPicPr>
         <p:blipFill>
-          <a:blip r:embed="rId2">
+          <a:blip r:embed="rId3">
             <a:extLst>
               <a:ext uri="{28A0092B-C50C-407E-A947-70E740481C1C}">
                 <a14:useLocalDpi xmlns:a14="http://schemas.microsoft.com/office/drawing/2010/main" val="0"/>
@@ -27955,7 +29573,7 @@
             <a:fld id="{F515360A-50F4-447F-B400-332B8D5DAD89}" type="datetime1">
               <a:rPr lang="pt-BR" smtClean="0"/>
               <a:pPr/>
-              <a:t>07/12/2015</a:t>
+              <a:t>08/12/2015</a:t>
             </a:fld>
             <a:endParaRPr lang="pt-BR"/>
           </a:p>
@@ -28113,7 +29731,7 @@
             <a:fld id="{F515360A-50F4-447F-B400-332B8D5DAD89}" type="datetime1">
               <a:rPr lang="pt-BR" smtClean="0"/>
               <a:pPr/>
-              <a:t>07/12/2015</a:t>
+              <a:t>08/12/2015</a:t>
             </a:fld>
             <a:endParaRPr lang="pt-BR"/>
           </a:p>
@@ -28224,7 +29842,7 @@
             <a:fld id="{2F3079A6-0B84-42FF-B3BC-2F035EC8EEF5}" type="datetime1">
               <a:rPr lang="pt-BR" smtClean="0"/>
               <a:pPr/>
-              <a:t>07/12/2015</a:t>
+              <a:t>08/12/2015</a:t>
             </a:fld>
             <a:endParaRPr lang="pt-BR"/>
           </a:p>
@@ -28410,7 +30028,7 @@
             <a:fld id="{F515360A-50F4-447F-B400-332B8D5DAD89}" type="datetime1">
               <a:rPr lang="pt-BR" smtClean="0"/>
               <a:pPr/>
-              <a:t>07/12/2015</a:t>
+              <a:t>08/12/2015</a:t>
             </a:fld>
             <a:endParaRPr lang="pt-BR"/>
           </a:p>
@@ -28516,7 +30134,7 @@
             <a:fld id="{F515360A-50F4-447F-B400-332B8D5DAD89}" type="datetime1">
               <a:rPr lang="pt-BR" smtClean="0"/>
               <a:pPr/>
-              <a:t>07/12/2015</a:t>
+              <a:t>08/12/2015</a:t>
             </a:fld>
             <a:endParaRPr lang="pt-BR"/>
           </a:p>
@@ -28567,7 +30185,7 @@
         </p:xfrm>
         <a:graphic>
           <a:graphicData uri="http://schemas.openxmlformats.org/drawingml/2006/diagram">
-            <dgm:relIds xmlns:dgm="http://schemas.openxmlformats.org/drawingml/2006/diagram" xmlns:r="http://schemas.openxmlformats.org/officeDocument/2006/relationships" r:dm="rId2" r:lo="rId3" r:qs="rId4" r:cs="rId5"/>
+            <dgm:relIds xmlns:dgm="http://schemas.openxmlformats.org/drawingml/2006/diagram" xmlns:r="http://schemas.openxmlformats.org/officeDocument/2006/relationships" r:dm="rId3" r:lo="rId4" r:qs="rId5" r:cs="rId6"/>
           </a:graphicData>
         </a:graphic>
       </p:graphicFrame>
@@ -28659,7 +30277,7 @@
             <a:fld id="{F515360A-50F4-447F-B400-332B8D5DAD89}" type="datetime1">
               <a:rPr lang="pt-BR" smtClean="0"/>
               <a:pPr/>
-              <a:t>07/12/2015</a:t>
+              <a:t>08/12/2015</a:t>
             </a:fld>
             <a:endParaRPr lang="pt-BR"/>
           </a:p>
@@ -29933,7 +31551,7 @@
             <a:fld id="{68173F01-A714-4100-9881-802D8F6927FB}" type="datetime1">
               <a:rPr lang="pt-BR" smtClean="0"/>
               <a:pPr/>
-              <a:t>07/12/2015</a:t>
+              <a:t>08/12/2015</a:t>
             </a:fld>
             <a:endParaRPr lang="pt-BR"/>
           </a:p>
@@ -30795,7 +32413,7 @@
             <a:fld id="{F515360A-50F4-447F-B400-332B8D5DAD89}" type="datetime1">
               <a:rPr lang="pt-BR" smtClean="0"/>
               <a:pPr/>
-              <a:t>07/12/2015</a:t>
+              <a:t>08/12/2015</a:t>
             </a:fld>
             <a:endParaRPr lang="pt-BR"/>
           </a:p>
@@ -30936,7 +32554,7 @@
             <a:fld id="{40B961B5-27C5-4679-BA5B-6812B7C367F6}" type="datetime1">
               <a:rPr lang="pt-BR" smtClean="0"/>
               <a:pPr/>
-              <a:t>07/12/2015</a:t>
+              <a:t>08/12/2015</a:t>
             </a:fld>
             <a:endParaRPr lang="pt-BR"/>
           </a:p>
@@ -31047,7 +32665,7 @@
             <a:fld id="{F515360A-50F4-447F-B400-332B8D5DAD89}" type="datetime1">
               <a:rPr lang="pt-BR" smtClean="0"/>
               <a:pPr/>
-              <a:t>07/12/2015</a:t>
+              <a:t>08/12/2015</a:t>
             </a:fld>
             <a:endParaRPr lang="pt-BR"/>
           </a:p>
@@ -31187,7 +32805,7 @@
             <a:fld id="{F515360A-50F4-447F-B400-332B8D5DAD89}" type="datetime1">
               <a:rPr lang="pt-BR" smtClean="0"/>
               <a:pPr/>
-              <a:t>07/12/2015</a:t>
+              <a:t>08/12/2015</a:t>
             </a:fld>
             <a:endParaRPr lang="pt-BR"/>
           </a:p>
@@ -31325,7 +32943,7 @@
             <a:fld id="{2F3079A6-0B84-42FF-B3BC-2F035EC8EEF5}" type="datetime1">
               <a:rPr lang="pt-BR" smtClean="0"/>
               <a:pPr/>
-              <a:t>07/12/2015</a:t>
+              <a:t>08/12/2015</a:t>
             </a:fld>
             <a:endParaRPr lang="pt-BR"/>
           </a:p>
@@ -31373,7 +32991,7 @@
         </p:xfrm>
         <a:graphic>
           <a:graphicData uri="http://schemas.openxmlformats.org/drawingml/2006/diagram">
-            <dgm:relIds xmlns:dgm="http://schemas.openxmlformats.org/drawingml/2006/diagram" xmlns:r="http://schemas.openxmlformats.org/officeDocument/2006/relationships" r:dm="rId2" r:lo="rId3" r:qs="rId4" r:cs="rId5"/>
+            <dgm:relIds xmlns:dgm="http://schemas.openxmlformats.org/drawingml/2006/diagram" xmlns:r="http://schemas.openxmlformats.org/officeDocument/2006/relationships" r:dm="rId3" r:lo="rId4" r:qs="rId5" r:cs="rId6"/>
           </a:graphicData>
         </a:graphic>
       </p:graphicFrame>
@@ -31496,7 +33114,7 @@
             <a:fld id="{E0674CC4-247B-4A45-A759-BD51C1E8225E}" type="datetime1">
               <a:rPr lang="pt-BR" smtClean="0"/>
               <a:pPr/>
-              <a:t>07/12/2015</a:t>
+              <a:t>08/12/2015</a:t>
             </a:fld>
             <a:endParaRPr lang="pt-BR"/>
           </a:p>
@@ -31544,7 +33162,7 @@
         </p:xfrm>
         <a:graphic>
           <a:graphicData uri="http://schemas.openxmlformats.org/drawingml/2006/diagram">
-            <dgm:relIds xmlns:dgm="http://schemas.openxmlformats.org/drawingml/2006/diagram" xmlns:r="http://schemas.openxmlformats.org/officeDocument/2006/relationships" r:dm="rId2" r:lo="rId3" r:qs="rId4" r:cs="rId5"/>
+            <dgm:relIds xmlns:dgm="http://schemas.openxmlformats.org/drawingml/2006/diagram" xmlns:r="http://schemas.openxmlformats.org/officeDocument/2006/relationships" r:dm="rId3" r:lo="rId4" r:qs="rId5" r:cs="rId6"/>
           </a:graphicData>
         </a:graphic>
       </p:graphicFrame>
@@ -31704,7 +33322,7 @@
             <a:fld id="{DB9E5ED1-FD16-4F27-A965-1AD7BE049826}" type="datetime1">
               <a:rPr lang="pt-BR" smtClean="0"/>
               <a:pPr/>
-              <a:t>07/12/2015</a:t>
+              <a:t>08/12/2015</a:t>
             </a:fld>
             <a:endParaRPr lang="pt-BR"/>
           </a:p>
@@ -32174,7 +33792,7 @@
             <a:fld id="{39D6C223-2971-4EA9-AD3F-84FAB077ADF5}" type="datetime1">
               <a:rPr lang="pt-BR" smtClean="0"/>
               <a:pPr/>
-              <a:t>07/12/2015</a:t>
+              <a:t>08/12/2015</a:t>
             </a:fld>
             <a:endParaRPr lang="pt-BR"/>
           </a:p>
@@ -32439,7 +34057,7 @@
             <a:fld id="{95EDED31-C95B-46BA-899D-77798EB3A477}" type="datetime1">
               <a:rPr lang="pt-BR" smtClean="0"/>
               <a:pPr/>
-              <a:t>07/12/2015</a:t>
+              <a:t>08/12/2015</a:t>
             </a:fld>
             <a:endParaRPr lang="pt-BR"/>
           </a:p>
@@ -32604,7 +34222,7 @@
             <a:fld id="{2E7D6B3C-FF37-4F46-A205-D4E6B2138E79}" type="datetime1">
               <a:rPr lang="pt-BR" smtClean="0"/>
               <a:pPr/>
-              <a:t>07/12/2015</a:t>
+              <a:t>08/12/2015</a:t>
             </a:fld>
             <a:endParaRPr lang="pt-BR"/>
           </a:p>
@@ -32720,7 +34338,7 @@
             <a:fld id="{F515360A-50F4-447F-B400-332B8D5DAD89}" type="datetime1">
               <a:rPr lang="pt-BR" smtClean="0"/>
               <a:pPr/>
-              <a:t>07/12/2015</a:t>
+              <a:t>08/12/2015</a:t>
             </a:fld>
             <a:endParaRPr lang="pt-BR"/>
           </a:p>
@@ -32759,7 +34377,7 @@
           <p:nvPr/>
         </p:nvPicPr>
         <p:blipFill>
-          <a:blip r:embed="rId2">
+          <a:blip r:embed="rId3">
             <a:extLst>
               <a:ext uri="{28A0092B-C50C-407E-A947-70E740481C1C}">
                 <a14:useLocalDpi xmlns:a14="http://schemas.microsoft.com/office/drawing/2010/main" val="0"/>

</xml_diff>